<commit_message>
cleaned up logo ppt file
</commit_message>
<xml_diff>
--- a/images/dsci-310-logo.pptx
+++ b/images/dsci-310-logo.pptx
@@ -3327,593 +3327,6 @@
           <a:chExt cx="0" cy="0"/>
         </a:xfrm>
       </p:grpSpPr>
-      <p:grpSp>
-        <p:nvGrpSpPr>
-          <p:cNvPr id="25" name="Group 24">
-            <a:extLst>
-              <a:ext uri="{FF2B5EF4-FFF2-40B4-BE49-F238E27FC236}">
-                <a16:creationId xmlns:a16="http://schemas.microsoft.com/office/drawing/2014/main" id="{1722F226-1869-8E41-815F-BB265B7B6D53}"/>
-              </a:ext>
-            </a:extLst>
-          </p:cNvPr>
-          <p:cNvGrpSpPr/>
-          <p:nvPr/>
-        </p:nvGrpSpPr>
-        <p:grpSpPr>
-          <a:xfrm>
-            <a:off x="-174735" y="302254"/>
-            <a:ext cx="3930285" cy="3051438"/>
-            <a:chOff x="1105853" y="3112532"/>
-            <a:chExt cx="3930285" cy="3051438"/>
-          </a:xfrm>
-        </p:grpSpPr>
-        <p:grpSp>
-          <p:nvGrpSpPr>
-            <p:cNvPr id="22" name="Group 21">
-              <a:extLst>
-                <a:ext uri="{FF2B5EF4-FFF2-40B4-BE49-F238E27FC236}">
-                  <a16:creationId xmlns:a16="http://schemas.microsoft.com/office/drawing/2014/main" id="{650D1902-47FF-2242-B336-0D2052D3BE04}"/>
-                </a:ext>
-              </a:extLst>
-            </p:cNvPr>
-            <p:cNvGrpSpPr/>
-            <p:nvPr/>
-          </p:nvGrpSpPr>
-          <p:grpSpPr>
-            <a:xfrm>
-              <a:off x="1105853" y="3112532"/>
-              <a:ext cx="3930285" cy="3051438"/>
-              <a:chOff x="1437530" y="3233922"/>
-              <a:chExt cx="3930285" cy="3051438"/>
-            </a:xfrm>
-          </p:grpSpPr>
-          <p:sp>
-            <p:nvSpPr>
-              <p:cNvPr id="9" name="Hexagon 8">
-                <a:extLst>
-                  <a:ext uri="{FF2B5EF4-FFF2-40B4-BE49-F238E27FC236}">
-                    <a16:creationId xmlns:a16="http://schemas.microsoft.com/office/drawing/2014/main" id="{31B49C59-83FA-844A-B1DE-60C8F25E914E}"/>
-                  </a:ext>
-                </a:extLst>
-              </p:cNvPr>
-              <p:cNvSpPr>
-                <a:spLocks noChangeAspect="1"/>
-              </p:cNvSpPr>
-              <p:nvPr/>
-            </p:nvSpPr>
-            <p:spPr>
-              <a:xfrm rot="1800000">
-                <a:off x="2099615" y="3605880"/>
-                <a:ext cx="2611301" cy="2273022"/>
-              </a:xfrm>
-              <a:prstGeom prst="hexagon">
-                <a:avLst>
-                  <a:gd name="adj" fmla="val 28372"/>
-                  <a:gd name="vf" fmla="val 115470"/>
-                </a:avLst>
-              </a:prstGeom>
-              <a:solidFill>
-                <a:schemeClr val="accent4">
-                  <a:lumMod val="20000"/>
-                  <a:lumOff val="80000"/>
-                </a:schemeClr>
-              </a:solidFill>
-              <a:ln w="69850">
-                <a:solidFill>
-                  <a:schemeClr val="tx1"/>
-                </a:solidFill>
-              </a:ln>
-            </p:spPr>
-            <p:style>
-              <a:lnRef idx="2">
-                <a:schemeClr val="accent1">
-                  <a:shade val="50000"/>
-                </a:schemeClr>
-              </a:lnRef>
-              <a:fillRef idx="1">
-                <a:schemeClr val="accent1"/>
-              </a:fillRef>
-              <a:effectRef idx="0">
-                <a:schemeClr val="accent1"/>
-              </a:effectRef>
-              <a:fontRef idx="minor">
-                <a:schemeClr val="lt1"/>
-              </a:fontRef>
-            </p:style>
-            <p:txBody>
-              <a:bodyPr rtlCol="0" anchor="ctr"/>
-              <a:lstStyle/>
-              <a:p>
-                <a:pPr algn="ctr"/>
-                <a:endParaRPr lang="en-US" dirty="0"/>
-              </a:p>
-            </p:txBody>
-          </p:sp>
-          <p:sp>
-            <p:nvSpPr>
-              <p:cNvPr id="11" name="TextBox 10">
-                <a:extLst>
-                  <a:ext uri="{FF2B5EF4-FFF2-40B4-BE49-F238E27FC236}">
-                    <a16:creationId xmlns:a16="http://schemas.microsoft.com/office/drawing/2014/main" id="{EBE895F9-9D5A-1B4D-A720-19BE2B31C910}"/>
-                  </a:ext>
-                </a:extLst>
-              </p:cNvPr>
-              <p:cNvSpPr txBox="1"/>
-              <p:nvPr/>
-            </p:nvSpPr>
-            <p:spPr>
-              <a:xfrm rot="19733941">
-                <a:off x="2136302" y="3528240"/>
-                <a:ext cx="2211213" cy="261610"/>
-              </a:xfrm>
-              <a:prstGeom prst="rect">
-                <a:avLst/>
-              </a:prstGeom>
-              <a:noFill/>
-            </p:spPr>
-            <p:txBody>
-              <a:bodyPr wrap="square" rtlCol="0">
-                <a:spAutoFit/>
-              </a:bodyPr>
-              <a:lstStyle/>
-              <a:p>
-                <a:r>
-                  <a:rPr lang="en-US" sz="1050" b="1" dirty="0">
-                    <a:latin typeface="Fira Sans" panose="020B0503050000020004" pitchFamily="34" charset="0"/>
-                  </a:rPr>
-                  <a:t>shinycustomloader</a:t>
-                </a:r>
-              </a:p>
-            </p:txBody>
-          </p:sp>
-          <p:sp>
-            <p:nvSpPr>
-              <p:cNvPr id="15" name="TextBox 14">
-                <a:extLst>
-                  <a:ext uri="{FF2B5EF4-FFF2-40B4-BE49-F238E27FC236}">
-                    <a16:creationId xmlns:a16="http://schemas.microsoft.com/office/drawing/2014/main" id="{B0FD5C7F-AC07-AC4E-8B7F-CFBADFDD503C}"/>
-                  </a:ext>
-                </a:extLst>
-              </p:cNvPr>
-              <p:cNvSpPr txBox="1"/>
-              <p:nvPr/>
-            </p:nvSpPr>
-            <p:spPr>
-              <a:xfrm rot="1826693">
-                <a:off x="3156602" y="3970980"/>
-                <a:ext cx="2211213" cy="261610"/>
-              </a:xfrm>
-              <a:prstGeom prst="rect">
-                <a:avLst/>
-              </a:prstGeom>
-              <a:noFill/>
-            </p:spPr>
-            <p:txBody>
-              <a:bodyPr wrap="square" rtlCol="0">
-                <a:spAutoFit/>
-              </a:bodyPr>
-              <a:lstStyle/>
-              <a:p>
-                <a:r>
-                  <a:rPr lang="en-US" sz="1050" b="1" dirty="0">
-                    <a:latin typeface="Fira Sans" panose="020B0503050000020004" pitchFamily="34" charset="0"/>
-                  </a:rPr>
-                  <a:t>shinycustomloader</a:t>
-                </a:r>
-              </a:p>
-            </p:txBody>
-          </p:sp>
-          <p:pic>
-            <p:nvPicPr>
-              <p:cNvPr id="16" name="Picture 15">
-                <a:extLst>
-                  <a:ext uri="{FF2B5EF4-FFF2-40B4-BE49-F238E27FC236}">
-                    <a16:creationId xmlns:a16="http://schemas.microsoft.com/office/drawing/2014/main" id="{65E255F4-C803-AC47-B6FE-468BA3BD9E68}"/>
-                  </a:ext>
-                </a:extLst>
-              </p:cNvPr>
-              <p:cNvPicPr>
-                <a:picLocks noChangeAspect="1"/>
-              </p:cNvPicPr>
-              <p:nvPr/>
-            </p:nvPicPr>
-            <p:blipFill>
-              <a:blip r:embed="rId2"/>
-              <a:stretch>
-                <a:fillRect/>
-              </a:stretch>
-            </p:blipFill>
-            <p:spPr>
-              <a:xfrm>
-                <a:off x="2718080" y="4084733"/>
-                <a:ext cx="1344659" cy="1344659"/>
-              </a:xfrm>
-              <a:prstGeom prst="rect">
-                <a:avLst/>
-              </a:prstGeom>
-            </p:spPr>
-          </p:pic>
-          <p:sp>
-            <p:nvSpPr>
-              <p:cNvPr id="17" name="TextBox 16">
-                <a:extLst>
-                  <a:ext uri="{FF2B5EF4-FFF2-40B4-BE49-F238E27FC236}">
-                    <a16:creationId xmlns:a16="http://schemas.microsoft.com/office/drawing/2014/main" id="{FD5CA8DE-3840-BA48-A3BE-A18C846ABAB0}"/>
-                  </a:ext>
-                </a:extLst>
-              </p:cNvPr>
-              <p:cNvSpPr txBox="1"/>
-              <p:nvPr/>
-            </p:nvSpPr>
-            <p:spPr>
-              <a:xfrm rot="5400000">
-                <a:off x="3329321" y="5048949"/>
-                <a:ext cx="2211213" cy="261610"/>
-              </a:xfrm>
-              <a:prstGeom prst="rect">
-                <a:avLst/>
-              </a:prstGeom>
-              <a:noFill/>
-            </p:spPr>
-            <p:txBody>
-              <a:bodyPr wrap="square" rtlCol="0">
-                <a:spAutoFit/>
-              </a:bodyPr>
-              <a:lstStyle/>
-              <a:p>
-                <a:r>
-                  <a:rPr lang="en-US" sz="1050" b="1" dirty="0">
-                    <a:latin typeface="Fira Sans" panose="020B0503050000020004" pitchFamily="34" charset="0"/>
-                  </a:rPr>
-                  <a:t>shinycustomloader</a:t>
-                </a:r>
-              </a:p>
-            </p:txBody>
-          </p:sp>
-          <p:sp>
-            <p:nvSpPr>
-              <p:cNvPr id="18" name="TextBox 17">
-                <a:extLst>
-                  <a:ext uri="{FF2B5EF4-FFF2-40B4-BE49-F238E27FC236}">
-                    <a16:creationId xmlns:a16="http://schemas.microsoft.com/office/drawing/2014/main" id="{55B1EBAC-B4A7-3D4F-998E-C7AB7F5FC136}"/>
-                  </a:ext>
-                </a:extLst>
-              </p:cNvPr>
-              <p:cNvSpPr txBox="1"/>
-              <p:nvPr/>
-            </p:nvSpPr>
-            <p:spPr>
-              <a:xfrm rot="8885002">
-                <a:off x="2440645" y="5741687"/>
-                <a:ext cx="2211213" cy="261610"/>
-              </a:xfrm>
-              <a:prstGeom prst="rect">
-                <a:avLst/>
-              </a:prstGeom>
-              <a:noFill/>
-            </p:spPr>
-            <p:txBody>
-              <a:bodyPr wrap="square" rtlCol="0">
-                <a:spAutoFit/>
-              </a:bodyPr>
-              <a:lstStyle/>
-              <a:p>
-                <a:r>
-                  <a:rPr lang="en-US" sz="1050" b="1" dirty="0">
-                    <a:latin typeface="Fira Sans" panose="020B0503050000020004" pitchFamily="34" charset="0"/>
-                  </a:rPr>
-                  <a:t>shinycustomloader</a:t>
-                </a:r>
-              </a:p>
-            </p:txBody>
-          </p:sp>
-          <p:sp>
-            <p:nvSpPr>
-              <p:cNvPr id="19" name="TextBox 18">
-                <a:extLst>
-                  <a:ext uri="{FF2B5EF4-FFF2-40B4-BE49-F238E27FC236}">
-                    <a16:creationId xmlns:a16="http://schemas.microsoft.com/office/drawing/2014/main" id="{8F786012-11EC-C341-BE9C-7916974631F6}"/>
-                  </a:ext>
-                </a:extLst>
-              </p:cNvPr>
-              <p:cNvSpPr txBox="1"/>
-              <p:nvPr/>
-            </p:nvSpPr>
-            <p:spPr>
-              <a:xfrm rot="12668743">
-                <a:off x="1437530" y="5287716"/>
-                <a:ext cx="2211213" cy="261610"/>
-              </a:xfrm>
-              <a:prstGeom prst="rect">
-                <a:avLst/>
-              </a:prstGeom>
-              <a:noFill/>
-            </p:spPr>
-            <p:txBody>
-              <a:bodyPr wrap="square" rtlCol="0">
-                <a:spAutoFit/>
-              </a:bodyPr>
-              <a:lstStyle/>
-              <a:p>
-                <a:r>
-                  <a:rPr lang="en-US" sz="1050" b="1" dirty="0">
-                    <a:latin typeface="Fira Sans" panose="020B0503050000020004" pitchFamily="34" charset="0"/>
-                  </a:rPr>
-                  <a:t>shinycustomloader</a:t>
-                </a:r>
-              </a:p>
-            </p:txBody>
-          </p:sp>
-          <p:sp>
-            <p:nvSpPr>
-              <p:cNvPr id="20" name="TextBox 19">
-                <a:extLst>
-                  <a:ext uri="{FF2B5EF4-FFF2-40B4-BE49-F238E27FC236}">
-                    <a16:creationId xmlns:a16="http://schemas.microsoft.com/office/drawing/2014/main" id="{BDF6217C-375B-8941-88DC-8CA681893C89}"/>
-                  </a:ext>
-                </a:extLst>
-              </p:cNvPr>
-              <p:cNvSpPr txBox="1"/>
-              <p:nvPr/>
-            </p:nvSpPr>
-            <p:spPr>
-              <a:xfrm rot="16200000">
-                <a:off x="1272938" y="4208724"/>
-                <a:ext cx="2211213" cy="261610"/>
-              </a:xfrm>
-              <a:prstGeom prst="rect">
-                <a:avLst/>
-              </a:prstGeom>
-              <a:noFill/>
-            </p:spPr>
-            <p:txBody>
-              <a:bodyPr wrap="square" rtlCol="0">
-                <a:spAutoFit/>
-              </a:bodyPr>
-              <a:lstStyle/>
-              <a:p>
-                <a:r>
-                  <a:rPr lang="en-US" sz="1050" b="1" dirty="0">
-                    <a:latin typeface="Fira Sans" panose="020B0503050000020004" pitchFamily="34" charset="0"/>
-                  </a:rPr>
-                  <a:t>shinycustomloader</a:t>
-                </a:r>
-              </a:p>
-            </p:txBody>
-          </p:sp>
-        </p:grpSp>
-        <p:sp>
-          <p:nvSpPr>
-            <p:cNvPr id="24" name="Rectangle 23">
-              <a:extLst>
-                <a:ext uri="{FF2B5EF4-FFF2-40B4-BE49-F238E27FC236}">
-                  <a16:creationId xmlns:a16="http://schemas.microsoft.com/office/drawing/2014/main" id="{A78A26EA-7943-3C4F-8756-B90456BD70B0}"/>
-                </a:ext>
-              </a:extLst>
-            </p:cNvPr>
-            <p:cNvSpPr/>
-            <p:nvPr/>
-          </p:nvSpPr>
-          <p:spPr>
-            <a:xfrm>
-              <a:off x="2378378" y="3907783"/>
-              <a:ext cx="1356773" cy="1879559"/>
-            </a:xfrm>
-            <a:prstGeom prst="rect">
-              <a:avLst/>
-            </a:prstGeom>
-            <a:noFill/>
-            <a:ln>
-              <a:noFill/>
-            </a:ln>
-          </p:spPr>
-          <p:txBody>
-            <a:bodyPr wrap="square" lIns="91440" tIns="45720" rIns="91440" bIns="45720">
-              <a:prstTxWarp prst="textArchUp">
-                <a:avLst/>
-              </a:prstTxWarp>
-              <a:spAutoFit/>
-            </a:bodyPr>
-            <a:lstStyle/>
-            <a:p>
-              <a:pPr algn="ctr"/>
-              <a:r>
-                <a:rPr lang="en-US" sz="3200" b="1" dirty="0">
-                  <a:ln w="12700">
-                    <a:solidFill>
-                      <a:schemeClr val="accent2"/>
-                    </a:solidFill>
-                    <a:prstDash val="solid"/>
-                  </a:ln>
-                  <a:solidFill>
-                    <a:schemeClr val="accent2"/>
-                  </a:solidFill>
-                  <a:effectLst>
-                    <a:outerShdw blurRad="50800" dist="38100" dir="5400000" algn="t" rotWithShape="0">
-                      <a:prstClr val="black">
-                        <a:alpha val="40000"/>
-                      </a:prstClr>
-                    </a:outerShdw>
-                  </a:effectLst>
-                </a:rPr>
-                <a:t>shinycustomloader</a:t>
-              </a:r>
-            </a:p>
-          </p:txBody>
-        </p:sp>
-      </p:grpSp>
-      <p:grpSp>
-        <p:nvGrpSpPr>
-          <p:cNvPr id="2" name="Group 1">
-            <a:extLst>
-              <a:ext uri="{FF2B5EF4-FFF2-40B4-BE49-F238E27FC236}">
-                <a16:creationId xmlns:a16="http://schemas.microsoft.com/office/drawing/2014/main" id="{9EE62A03-0923-D148-96E5-750FD63540D7}"/>
-              </a:ext>
-            </a:extLst>
-          </p:cNvPr>
-          <p:cNvGrpSpPr/>
-          <p:nvPr/>
-        </p:nvGrpSpPr>
-        <p:grpSpPr>
-          <a:xfrm>
-            <a:off x="521671" y="3636371"/>
-            <a:ext cx="2721600" cy="2369033"/>
-            <a:chOff x="4449163" y="1581680"/>
-            <a:chExt cx="2721600" cy="2369033"/>
-          </a:xfrm>
-        </p:grpSpPr>
-        <p:sp>
-          <p:nvSpPr>
-            <p:cNvPr id="34" name="Hexagon 33">
-              <a:extLst>
-                <a:ext uri="{FF2B5EF4-FFF2-40B4-BE49-F238E27FC236}">
-                  <a16:creationId xmlns:a16="http://schemas.microsoft.com/office/drawing/2014/main" id="{249726FC-7986-8A4B-866D-A442DA5692AA}"/>
-                </a:ext>
-              </a:extLst>
-            </p:cNvPr>
-            <p:cNvSpPr>
-              <a:spLocks noChangeAspect="1"/>
-            </p:cNvSpPr>
-            <p:nvPr/>
-          </p:nvSpPr>
-          <p:spPr>
-            <a:xfrm rot="1800000">
-              <a:off x="4449163" y="1581680"/>
-              <a:ext cx="2721600" cy="2369033"/>
-            </a:xfrm>
-            <a:prstGeom prst="hexagon">
-              <a:avLst>
-                <a:gd name="adj" fmla="val 28372"/>
-                <a:gd name="vf" fmla="val 115470"/>
-              </a:avLst>
-            </a:prstGeom>
-            <a:solidFill>
-              <a:schemeClr val="accent4">
-                <a:lumMod val="20000"/>
-                <a:lumOff val="80000"/>
-              </a:schemeClr>
-            </a:solidFill>
-            <a:ln w="69850">
-              <a:solidFill>
-                <a:schemeClr val="tx1"/>
-              </a:solidFill>
-            </a:ln>
-          </p:spPr>
-          <p:style>
-            <a:lnRef idx="2">
-              <a:schemeClr val="accent1">
-                <a:shade val="50000"/>
-              </a:schemeClr>
-            </a:lnRef>
-            <a:fillRef idx="1">
-              <a:schemeClr val="accent1"/>
-            </a:fillRef>
-            <a:effectRef idx="0">
-              <a:schemeClr val="accent1"/>
-            </a:effectRef>
-            <a:fontRef idx="minor">
-              <a:schemeClr val="lt1"/>
-            </a:fontRef>
-          </p:style>
-          <p:txBody>
-            <a:bodyPr rtlCol="0" anchor="ctr"/>
-            <a:lstStyle/>
-            <a:p>
-              <a:pPr algn="ctr"/>
-              <a:endParaRPr lang="en-US" dirty="0"/>
-            </a:p>
-          </p:txBody>
-        </p:sp>
-        <p:pic>
-          <p:nvPicPr>
-            <p:cNvPr id="35" name="Picture 34">
-              <a:extLst>
-                <a:ext uri="{FF2B5EF4-FFF2-40B4-BE49-F238E27FC236}">
-                  <a16:creationId xmlns:a16="http://schemas.microsoft.com/office/drawing/2014/main" id="{4611CDD7-ACB9-654D-9504-8BB131BBE37F}"/>
-                </a:ext>
-              </a:extLst>
-            </p:cNvPr>
-            <p:cNvPicPr>
-              <a:picLocks noChangeAspect="1"/>
-            </p:cNvPicPr>
-            <p:nvPr/>
-          </p:nvPicPr>
-          <p:blipFill>
-            <a:blip r:embed="rId2"/>
-            <a:stretch>
-              <a:fillRect/>
-            </a:stretch>
-          </p:blipFill>
-          <p:spPr>
-            <a:xfrm>
-              <a:off x="5159692" y="2133323"/>
-              <a:ext cx="1344659" cy="1344659"/>
-            </a:xfrm>
-            <a:prstGeom prst="rect">
-              <a:avLst/>
-            </a:prstGeom>
-          </p:spPr>
-        </p:pic>
-        <p:sp>
-          <p:nvSpPr>
-            <p:cNvPr id="33" name="Rectangle 32">
-              <a:extLst>
-                <a:ext uri="{FF2B5EF4-FFF2-40B4-BE49-F238E27FC236}">
-                  <a16:creationId xmlns:a16="http://schemas.microsoft.com/office/drawing/2014/main" id="{90AC14C0-08F9-884D-8462-A12F37203523}"/>
-                </a:ext>
-              </a:extLst>
-            </p:cNvPr>
-            <p:cNvSpPr/>
-            <p:nvPr/>
-          </p:nvSpPr>
-          <p:spPr>
-            <a:xfrm rot="179386">
-              <a:off x="4953805" y="1944363"/>
-              <a:ext cx="1708855" cy="1980257"/>
-            </a:xfrm>
-            <a:prstGeom prst="rect">
-              <a:avLst/>
-            </a:prstGeom>
-            <a:noFill/>
-            <a:ln>
-              <a:noFill/>
-            </a:ln>
-          </p:spPr>
-          <p:txBody>
-            <a:bodyPr wrap="square" lIns="91440" tIns="45720" rIns="91440" bIns="45720">
-              <a:prstTxWarp prst="textArchUp">
-                <a:avLst/>
-              </a:prstTxWarp>
-              <a:spAutoFit/>
-            </a:bodyPr>
-            <a:lstStyle/>
-            <a:p>
-              <a:pPr algn="ctr"/>
-              <a:r>
-                <a:rPr lang="en-US" sz="6600" b="1" dirty="0">
-                  <a:ln w="12700">
-                    <a:solidFill>
-                      <a:schemeClr val="accent2"/>
-                    </a:solidFill>
-                    <a:prstDash val="solid"/>
-                  </a:ln>
-                  <a:solidFill>
-                    <a:schemeClr val="accent2"/>
-                  </a:solidFill>
-                  <a:effectLst>
-                    <a:outerShdw blurRad="50800" dist="38100" dir="5400000" algn="t" rotWithShape="0">
-                      <a:prstClr val="black">
-                        <a:alpha val="40000"/>
-                      </a:prstClr>
-                    </a:outerShdw>
-                  </a:effectLst>
-                </a:rPr>
-                <a:t>shinycustomloader</a:t>
-              </a:r>
-            </a:p>
-          </p:txBody>
-        </p:sp>
-      </p:grpSp>
       <p:sp>
         <p:nvSpPr>
           <p:cNvPr id="36" name="Hexagon 35">
@@ -3988,7 +3401,7 @@
           <p:nvPr/>
         </p:nvPicPr>
         <p:blipFill>
-          <a:blip r:embed="rId3"/>
+          <a:blip r:embed="rId2"/>
           <a:stretch>
             <a:fillRect/>
           </a:stretch>
@@ -4051,42 +3464,12 @@
           </a:p>
         </p:txBody>
       </p:sp>
-    </p:spTree>
-    <p:extLst>
-      <p:ext uri="{BB962C8B-B14F-4D97-AF65-F5344CB8AC3E}">
-        <p14:creationId xmlns:p14="http://schemas.microsoft.com/office/powerpoint/2010/main" val="421413058"/>
-      </p:ext>
-    </p:extLst>
-  </p:cSld>
-  <p:clrMapOvr>
-    <a:masterClrMapping/>
-  </p:clrMapOvr>
-</p:sld>
-</file>
-
-<file path=ppt/slides/slide2.xml><?xml version="1.0" encoding="utf-8"?>
-<p:sld xmlns:a="http://schemas.openxmlformats.org/drawingml/2006/main" xmlns:r="http://schemas.openxmlformats.org/officeDocument/2006/relationships" xmlns:p="http://schemas.openxmlformats.org/presentationml/2006/main">
-  <p:cSld>
-    <p:spTree>
-      <p:nvGrpSpPr>
-        <p:cNvPr id="1" name=""/>
-        <p:cNvGrpSpPr/>
-        <p:nvPr/>
-      </p:nvGrpSpPr>
-      <p:grpSpPr>
-        <a:xfrm>
-          <a:off x="0" y="0"/>
-          <a:ext cx="0" cy="0"/>
-          <a:chOff x="0" y="0"/>
-          <a:chExt cx="0" cy="0"/>
-        </a:xfrm>
-      </p:grpSpPr>
-      <p:sp>
-        <p:nvSpPr>
-          <p:cNvPr id="36" name="Hexagon 35">
-            <a:extLst>
-              <a:ext uri="{FF2B5EF4-FFF2-40B4-BE49-F238E27FC236}">
-                <a16:creationId xmlns:a16="http://schemas.microsoft.com/office/drawing/2014/main" id="{90E46B38-1301-774F-8904-FFF8966BD8C2}"/>
+      <p:sp>
+        <p:nvSpPr>
+          <p:cNvPr id="28" name="Hexagon 27">
+            <a:extLst>
+              <a:ext uri="{FF2B5EF4-FFF2-40B4-BE49-F238E27FC236}">
+                <a16:creationId xmlns:a16="http://schemas.microsoft.com/office/drawing/2014/main" id="{41AE6F35-FD98-974A-953E-BE1483DEE796}"/>
               </a:ext>
             </a:extLst>
           </p:cNvPr>
@@ -4142,10 +3525,10 @@
       </p:sp>
       <p:sp>
         <p:nvSpPr>
-          <p:cNvPr id="28" name="Hexagon 27">
-            <a:extLst>
-              <a:ext uri="{FF2B5EF4-FFF2-40B4-BE49-F238E27FC236}">
-                <a16:creationId xmlns:a16="http://schemas.microsoft.com/office/drawing/2014/main" id="{CE262696-2CA3-D041-9FBF-B906C53D25F2}"/>
+          <p:cNvPr id="29" name="Hexagon 28">
+            <a:extLst>
+              <a:ext uri="{FF2B5EF4-FFF2-40B4-BE49-F238E27FC236}">
+                <a16:creationId xmlns:a16="http://schemas.microsoft.com/office/drawing/2014/main" id="{593AA835-83C1-D84E-BBB1-6C8F832AC1A0}"/>
               </a:ext>
             </a:extLst>
           </p:cNvPr>
@@ -4208,599 +3591,12 @@
           </a:p>
         </p:txBody>
       </p:sp>
-      <p:grpSp>
-        <p:nvGrpSpPr>
-          <p:cNvPr id="25" name="Group 24">
-            <a:extLst>
-              <a:ext uri="{FF2B5EF4-FFF2-40B4-BE49-F238E27FC236}">
-                <a16:creationId xmlns:a16="http://schemas.microsoft.com/office/drawing/2014/main" id="{1722F226-1869-8E41-815F-BB265B7B6D53}"/>
-              </a:ext>
-            </a:extLst>
-          </p:cNvPr>
-          <p:cNvGrpSpPr/>
-          <p:nvPr/>
-        </p:nvGrpSpPr>
-        <p:grpSpPr>
-          <a:xfrm>
-            <a:off x="-174735" y="302254"/>
-            <a:ext cx="3930285" cy="3051438"/>
-            <a:chOff x="1105853" y="3112532"/>
-            <a:chExt cx="3930285" cy="3051438"/>
-          </a:xfrm>
-        </p:grpSpPr>
-        <p:grpSp>
-          <p:nvGrpSpPr>
-            <p:cNvPr id="22" name="Group 21">
-              <a:extLst>
-                <a:ext uri="{FF2B5EF4-FFF2-40B4-BE49-F238E27FC236}">
-                  <a16:creationId xmlns:a16="http://schemas.microsoft.com/office/drawing/2014/main" id="{650D1902-47FF-2242-B336-0D2052D3BE04}"/>
-                </a:ext>
-              </a:extLst>
-            </p:cNvPr>
-            <p:cNvGrpSpPr/>
-            <p:nvPr/>
-          </p:nvGrpSpPr>
-          <p:grpSpPr>
-            <a:xfrm>
-              <a:off x="1105853" y="3112532"/>
-              <a:ext cx="3930285" cy="3051438"/>
-              <a:chOff x="1437530" y="3233922"/>
-              <a:chExt cx="3930285" cy="3051438"/>
-            </a:xfrm>
-          </p:grpSpPr>
-          <p:sp>
-            <p:nvSpPr>
-              <p:cNvPr id="9" name="Hexagon 8">
-                <a:extLst>
-                  <a:ext uri="{FF2B5EF4-FFF2-40B4-BE49-F238E27FC236}">
-                    <a16:creationId xmlns:a16="http://schemas.microsoft.com/office/drawing/2014/main" id="{31B49C59-83FA-844A-B1DE-60C8F25E914E}"/>
-                  </a:ext>
-                </a:extLst>
-              </p:cNvPr>
-              <p:cNvSpPr>
-                <a:spLocks noChangeAspect="1"/>
-              </p:cNvSpPr>
-              <p:nvPr/>
-            </p:nvSpPr>
-            <p:spPr>
-              <a:xfrm rot="1800000">
-                <a:off x="2099615" y="3605880"/>
-                <a:ext cx="2611301" cy="2273022"/>
-              </a:xfrm>
-              <a:prstGeom prst="hexagon">
-                <a:avLst>
-                  <a:gd name="adj" fmla="val 28372"/>
-                  <a:gd name="vf" fmla="val 115470"/>
-                </a:avLst>
-              </a:prstGeom>
-              <a:solidFill>
-                <a:schemeClr val="accent4">
-                  <a:lumMod val="20000"/>
-                  <a:lumOff val="80000"/>
-                </a:schemeClr>
-              </a:solidFill>
-              <a:ln w="69850">
-                <a:solidFill>
-                  <a:schemeClr val="tx1"/>
-                </a:solidFill>
-              </a:ln>
-            </p:spPr>
-            <p:style>
-              <a:lnRef idx="2">
-                <a:schemeClr val="accent1">
-                  <a:shade val="50000"/>
-                </a:schemeClr>
-              </a:lnRef>
-              <a:fillRef idx="1">
-                <a:schemeClr val="accent1"/>
-              </a:fillRef>
-              <a:effectRef idx="0">
-                <a:schemeClr val="accent1"/>
-              </a:effectRef>
-              <a:fontRef idx="minor">
-                <a:schemeClr val="lt1"/>
-              </a:fontRef>
-            </p:style>
-            <p:txBody>
-              <a:bodyPr rtlCol="0" anchor="ctr"/>
-              <a:lstStyle/>
-              <a:p>
-                <a:pPr algn="ctr"/>
-                <a:endParaRPr lang="en-US" dirty="0"/>
-              </a:p>
-            </p:txBody>
-          </p:sp>
-          <p:sp>
-            <p:nvSpPr>
-              <p:cNvPr id="11" name="TextBox 10">
-                <a:extLst>
-                  <a:ext uri="{FF2B5EF4-FFF2-40B4-BE49-F238E27FC236}">
-                    <a16:creationId xmlns:a16="http://schemas.microsoft.com/office/drawing/2014/main" id="{EBE895F9-9D5A-1B4D-A720-19BE2B31C910}"/>
-                  </a:ext>
-                </a:extLst>
-              </p:cNvPr>
-              <p:cNvSpPr txBox="1"/>
-              <p:nvPr/>
-            </p:nvSpPr>
-            <p:spPr>
-              <a:xfrm rot="19733941">
-                <a:off x="2136302" y="3528240"/>
-                <a:ext cx="2211213" cy="261610"/>
-              </a:xfrm>
-              <a:prstGeom prst="rect">
-                <a:avLst/>
-              </a:prstGeom>
-              <a:noFill/>
-            </p:spPr>
-            <p:txBody>
-              <a:bodyPr wrap="square" rtlCol="0">
-                <a:spAutoFit/>
-              </a:bodyPr>
-              <a:lstStyle/>
-              <a:p>
-                <a:r>
-                  <a:rPr lang="en-US" sz="1050" b="1" dirty="0">
-                    <a:latin typeface="Fira Sans" panose="020B0503050000020004" pitchFamily="34" charset="0"/>
-                  </a:rPr>
-                  <a:t>shinycustomloader</a:t>
-                </a:r>
-              </a:p>
-            </p:txBody>
-          </p:sp>
-          <p:sp>
-            <p:nvSpPr>
-              <p:cNvPr id="15" name="TextBox 14">
-                <a:extLst>
-                  <a:ext uri="{FF2B5EF4-FFF2-40B4-BE49-F238E27FC236}">
-                    <a16:creationId xmlns:a16="http://schemas.microsoft.com/office/drawing/2014/main" id="{B0FD5C7F-AC07-AC4E-8B7F-CFBADFDD503C}"/>
-                  </a:ext>
-                </a:extLst>
-              </p:cNvPr>
-              <p:cNvSpPr txBox="1"/>
-              <p:nvPr/>
-            </p:nvSpPr>
-            <p:spPr>
-              <a:xfrm rot="1826693">
-                <a:off x="3156602" y="3970980"/>
-                <a:ext cx="2211213" cy="261610"/>
-              </a:xfrm>
-              <a:prstGeom prst="rect">
-                <a:avLst/>
-              </a:prstGeom>
-              <a:noFill/>
-            </p:spPr>
-            <p:txBody>
-              <a:bodyPr wrap="square" rtlCol="0">
-                <a:spAutoFit/>
-              </a:bodyPr>
-              <a:lstStyle/>
-              <a:p>
-                <a:r>
-                  <a:rPr lang="en-US" sz="1050" b="1" dirty="0">
-                    <a:latin typeface="Fira Sans" panose="020B0503050000020004" pitchFamily="34" charset="0"/>
-                  </a:rPr>
-                  <a:t>shinycustomloader</a:t>
-                </a:r>
-              </a:p>
-            </p:txBody>
-          </p:sp>
-          <p:pic>
-            <p:nvPicPr>
-              <p:cNvPr id="16" name="Picture 15">
-                <a:extLst>
-                  <a:ext uri="{FF2B5EF4-FFF2-40B4-BE49-F238E27FC236}">
-                    <a16:creationId xmlns:a16="http://schemas.microsoft.com/office/drawing/2014/main" id="{65E255F4-C803-AC47-B6FE-468BA3BD9E68}"/>
-                  </a:ext>
-                </a:extLst>
-              </p:cNvPr>
-              <p:cNvPicPr>
-                <a:picLocks noChangeAspect="1"/>
-              </p:cNvPicPr>
-              <p:nvPr/>
-            </p:nvPicPr>
-            <p:blipFill>
-              <a:blip r:embed="rId2"/>
-              <a:stretch>
-                <a:fillRect/>
-              </a:stretch>
-            </p:blipFill>
-            <p:spPr>
-              <a:xfrm>
-                <a:off x="2718080" y="4084733"/>
-                <a:ext cx="1344659" cy="1344659"/>
-              </a:xfrm>
-              <a:prstGeom prst="rect">
-                <a:avLst/>
-              </a:prstGeom>
-            </p:spPr>
-          </p:pic>
-          <p:sp>
-            <p:nvSpPr>
-              <p:cNvPr id="17" name="TextBox 16">
-                <a:extLst>
-                  <a:ext uri="{FF2B5EF4-FFF2-40B4-BE49-F238E27FC236}">
-                    <a16:creationId xmlns:a16="http://schemas.microsoft.com/office/drawing/2014/main" id="{FD5CA8DE-3840-BA48-A3BE-A18C846ABAB0}"/>
-                  </a:ext>
-                </a:extLst>
-              </p:cNvPr>
-              <p:cNvSpPr txBox="1"/>
-              <p:nvPr/>
-            </p:nvSpPr>
-            <p:spPr>
-              <a:xfrm rot="5400000">
-                <a:off x="3329321" y="5048949"/>
-                <a:ext cx="2211213" cy="261610"/>
-              </a:xfrm>
-              <a:prstGeom prst="rect">
-                <a:avLst/>
-              </a:prstGeom>
-              <a:noFill/>
-            </p:spPr>
-            <p:txBody>
-              <a:bodyPr wrap="square" rtlCol="0">
-                <a:spAutoFit/>
-              </a:bodyPr>
-              <a:lstStyle/>
-              <a:p>
-                <a:r>
-                  <a:rPr lang="en-US" sz="1050" b="1" dirty="0">
-                    <a:latin typeface="Fira Sans" panose="020B0503050000020004" pitchFamily="34" charset="0"/>
-                  </a:rPr>
-                  <a:t>shinycustomloader</a:t>
-                </a:r>
-              </a:p>
-            </p:txBody>
-          </p:sp>
-          <p:sp>
-            <p:nvSpPr>
-              <p:cNvPr id="18" name="TextBox 17">
-                <a:extLst>
-                  <a:ext uri="{FF2B5EF4-FFF2-40B4-BE49-F238E27FC236}">
-                    <a16:creationId xmlns:a16="http://schemas.microsoft.com/office/drawing/2014/main" id="{55B1EBAC-B4A7-3D4F-998E-C7AB7F5FC136}"/>
-                  </a:ext>
-                </a:extLst>
-              </p:cNvPr>
-              <p:cNvSpPr txBox="1"/>
-              <p:nvPr/>
-            </p:nvSpPr>
-            <p:spPr>
-              <a:xfrm rot="8885002">
-                <a:off x="2440645" y="5741687"/>
-                <a:ext cx="2211213" cy="261610"/>
-              </a:xfrm>
-              <a:prstGeom prst="rect">
-                <a:avLst/>
-              </a:prstGeom>
-              <a:noFill/>
-            </p:spPr>
-            <p:txBody>
-              <a:bodyPr wrap="square" rtlCol="0">
-                <a:spAutoFit/>
-              </a:bodyPr>
-              <a:lstStyle/>
-              <a:p>
-                <a:r>
-                  <a:rPr lang="en-US" sz="1050" b="1" dirty="0">
-                    <a:latin typeface="Fira Sans" panose="020B0503050000020004" pitchFamily="34" charset="0"/>
-                  </a:rPr>
-                  <a:t>shinycustomloader</a:t>
-                </a:r>
-              </a:p>
-            </p:txBody>
-          </p:sp>
-          <p:sp>
-            <p:nvSpPr>
-              <p:cNvPr id="19" name="TextBox 18">
-                <a:extLst>
-                  <a:ext uri="{FF2B5EF4-FFF2-40B4-BE49-F238E27FC236}">
-                    <a16:creationId xmlns:a16="http://schemas.microsoft.com/office/drawing/2014/main" id="{8F786012-11EC-C341-BE9C-7916974631F6}"/>
-                  </a:ext>
-                </a:extLst>
-              </p:cNvPr>
-              <p:cNvSpPr txBox="1"/>
-              <p:nvPr/>
-            </p:nvSpPr>
-            <p:spPr>
-              <a:xfrm rot="12668743">
-                <a:off x="1437530" y="5287716"/>
-                <a:ext cx="2211213" cy="261610"/>
-              </a:xfrm>
-              <a:prstGeom prst="rect">
-                <a:avLst/>
-              </a:prstGeom>
-              <a:noFill/>
-            </p:spPr>
-            <p:txBody>
-              <a:bodyPr wrap="square" rtlCol="0">
-                <a:spAutoFit/>
-              </a:bodyPr>
-              <a:lstStyle/>
-              <a:p>
-                <a:r>
-                  <a:rPr lang="en-US" sz="1050" b="1" dirty="0">
-                    <a:latin typeface="Fira Sans" panose="020B0503050000020004" pitchFamily="34" charset="0"/>
-                  </a:rPr>
-                  <a:t>shinycustomloader</a:t>
-                </a:r>
-              </a:p>
-            </p:txBody>
-          </p:sp>
-          <p:sp>
-            <p:nvSpPr>
-              <p:cNvPr id="20" name="TextBox 19">
-                <a:extLst>
-                  <a:ext uri="{FF2B5EF4-FFF2-40B4-BE49-F238E27FC236}">
-                    <a16:creationId xmlns:a16="http://schemas.microsoft.com/office/drawing/2014/main" id="{BDF6217C-375B-8941-88DC-8CA681893C89}"/>
-                  </a:ext>
-                </a:extLst>
-              </p:cNvPr>
-              <p:cNvSpPr txBox="1"/>
-              <p:nvPr/>
-            </p:nvSpPr>
-            <p:spPr>
-              <a:xfrm rot="16200000">
-                <a:off x="1272938" y="4208724"/>
-                <a:ext cx="2211213" cy="261610"/>
-              </a:xfrm>
-              <a:prstGeom prst="rect">
-                <a:avLst/>
-              </a:prstGeom>
-              <a:noFill/>
-            </p:spPr>
-            <p:txBody>
-              <a:bodyPr wrap="square" rtlCol="0">
-                <a:spAutoFit/>
-              </a:bodyPr>
-              <a:lstStyle/>
-              <a:p>
-                <a:r>
-                  <a:rPr lang="en-US" sz="1050" b="1" dirty="0">
-                    <a:latin typeface="Fira Sans" panose="020B0503050000020004" pitchFamily="34" charset="0"/>
-                  </a:rPr>
-                  <a:t>shinycustomloader</a:t>
-                </a:r>
-              </a:p>
-            </p:txBody>
-          </p:sp>
-        </p:grpSp>
-        <p:sp>
-          <p:nvSpPr>
-            <p:cNvPr id="24" name="Rectangle 23">
-              <a:extLst>
-                <a:ext uri="{FF2B5EF4-FFF2-40B4-BE49-F238E27FC236}">
-                  <a16:creationId xmlns:a16="http://schemas.microsoft.com/office/drawing/2014/main" id="{A78A26EA-7943-3C4F-8756-B90456BD70B0}"/>
-                </a:ext>
-              </a:extLst>
-            </p:cNvPr>
-            <p:cNvSpPr/>
-            <p:nvPr/>
-          </p:nvSpPr>
-          <p:spPr>
-            <a:xfrm>
-              <a:off x="2378378" y="3907783"/>
-              <a:ext cx="1356773" cy="1879559"/>
-            </a:xfrm>
-            <a:prstGeom prst="rect">
-              <a:avLst/>
-            </a:prstGeom>
-            <a:noFill/>
-            <a:ln>
-              <a:noFill/>
-            </a:ln>
-          </p:spPr>
-          <p:txBody>
-            <a:bodyPr wrap="square" lIns="91440" tIns="45720" rIns="91440" bIns="45720">
-              <a:prstTxWarp prst="textArchUp">
-                <a:avLst/>
-              </a:prstTxWarp>
-              <a:spAutoFit/>
-            </a:bodyPr>
-            <a:lstStyle/>
-            <a:p>
-              <a:pPr algn="ctr"/>
-              <a:r>
-                <a:rPr lang="en-US" sz="3200" b="1" dirty="0">
-                  <a:ln w="12700">
-                    <a:solidFill>
-                      <a:schemeClr val="accent2"/>
-                    </a:solidFill>
-                    <a:prstDash val="solid"/>
-                  </a:ln>
-                  <a:solidFill>
-                    <a:schemeClr val="accent2"/>
-                  </a:solidFill>
-                  <a:effectLst>
-                    <a:outerShdw blurRad="50800" dist="38100" dir="5400000" algn="t" rotWithShape="0">
-                      <a:prstClr val="black">
-                        <a:alpha val="40000"/>
-                      </a:prstClr>
-                    </a:outerShdw>
-                  </a:effectLst>
-                </a:rPr>
-                <a:t>shinycustomloader</a:t>
-              </a:r>
-            </a:p>
-          </p:txBody>
-        </p:sp>
-      </p:grpSp>
-      <p:grpSp>
-        <p:nvGrpSpPr>
-          <p:cNvPr id="2" name="Group 1">
-            <a:extLst>
-              <a:ext uri="{FF2B5EF4-FFF2-40B4-BE49-F238E27FC236}">
-                <a16:creationId xmlns:a16="http://schemas.microsoft.com/office/drawing/2014/main" id="{9EE62A03-0923-D148-96E5-750FD63540D7}"/>
-              </a:ext>
-            </a:extLst>
-          </p:cNvPr>
-          <p:cNvGrpSpPr/>
-          <p:nvPr/>
-        </p:nvGrpSpPr>
-        <p:grpSpPr>
-          <a:xfrm>
-            <a:off x="521671" y="3636371"/>
-            <a:ext cx="2721600" cy="2369033"/>
-            <a:chOff x="4449163" y="1581680"/>
-            <a:chExt cx="2721600" cy="2369033"/>
-          </a:xfrm>
-        </p:grpSpPr>
-        <p:sp>
-          <p:nvSpPr>
-            <p:cNvPr id="34" name="Hexagon 33">
-              <a:extLst>
-                <a:ext uri="{FF2B5EF4-FFF2-40B4-BE49-F238E27FC236}">
-                  <a16:creationId xmlns:a16="http://schemas.microsoft.com/office/drawing/2014/main" id="{249726FC-7986-8A4B-866D-A442DA5692AA}"/>
-                </a:ext>
-              </a:extLst>
-            </p:cNvPr>
-            <p:cNvSpPr>
-              <a:spLocks noChangeAspect="1"/>
-            </p:cNvSpPr>
-            <p:nvPr/>
-          </p:nvSpPr>
-          <p:spPr>
-            <a:xfrm rot="1800000">
-              <a:off x="4449163" y="1581680"/>
-              <a:ext cx="2721600" cy="2369033"/>
-            </a:xfrm>
-            <a:prstGeom prst="hexagon">
-              <a:avLst>
-                <a:gd name="adj" fmla="val 28372"/>
-                <a:gd name="vf" fmla="val 115470"/>
-              </a:avLst>
-            </a:prstGeom>
-            <a:solidFill>
-              <a:schemeClr val="accent4">
-                <a:lumMod val="20000"/>
-                <a:lumOff val="80000"/>
-              </a:schemeClr>
-            </a:solidFill>
-            <a:ln w="69850">
-              <a:solidFill>
-                <a:schemeClr val="tx1"/>
-              </a:solidFill>
-            </a:ln>
-          </p:spPr>
-          <p:style>
-            <a:lnRef idx="2">
-              <a:schemeClr val="accent1">
-                <a:shade val="50000"/>
-              </a:schemeClr>
-            </a:lnRef>
-            <a:fillRef idx="1">
-              <a:schemeClr val="accent1"/>
-            </a:fillRef>
-            <a:effectRef idx="0">
-              <a:schemeClr val="accent1"/>
-            </a:effectRef>
-            <a:fontRef idx="minor">
-              <a:schemeClr val="lt1"/>
-            </a:fontRef>
-          </p:style>
-          <p:txBody>
-            <a:bodyPr rtlCol="0" anchor="ctr"/>
-            <a:lstStyle/>
-            <a:p>
-              <a:pPr algn="ctr"/>
-              <a:endParaRPr lang="en-US" dirty="0"/>
-            </a:p>
-          </p:txBody>
-        </p:sp>
-        <p:pic>
-          <p:nvPicPr>
-            <p:cNvPr id="35" name="Picture 34">
-              <a:extLst>
-                <a:ext uri="{FF2B5EF4-FFF2-40B4-BE49-F238E27FC236}">
-                  <a16:creationId xmlns:a16="http://schemas.microsoft.com/office/drawing/2014/main" id="{4611CDD7-ACB9-654D-9504-8BB131BBE37F}"/>
-                </a:ext>
-              </a:extLst>
-            </p:cNvPr>
-            <p:cNvPicPr>
-              <a:picLocks noChangeAspect="1"/>
-            </p:cNvPicPr>
-            <p:nvPr/>
-          </p:nvPicPr>
-          <p:blipFill>
-            <a:blip r:embed="rId2"/>
-            <a:stretch>
-              <a:fillRect/>
-            </a:stretch>
-          </p:blipFill>
-          <p:spPr>
-            <a:xfrm>
-              <a:off x="5159692" y="2133323"/>
-              <a:ext cx="1344659" cy="1344659"/>
-            </a:xfrm>
-            <a:prstGeom prst="rect">
-              <a:avLst/>
-            </a:prstGeom>
-          </p:spPr>
-        </p:pic>
-        <p:sp>
-          <p:nvSpPr>
-            <p:cNvPr id="33" name="Rectangle 32">
-              <a:extLst>
-                <a:ext uri="{FF2B5EF4-FFF2-40B4-BE49-F238E27FC236}">
-                  <a16:creationId xmlns:a16="http://schemas.microsoft.com/office/drawing/2014/main" id="{90AC14C0-08F9-884D-8462-A12F37203523}"/>
-                </a:ext>
-              </a:extLst>
-            </p:cNvPr>
-            <p:cNvSpPr/>
-            <p:nvPr/>
-          </p:nvSpPr>
-          <p:spPr>
-            <a:xfrm rot="179386">
-              <a:off x="4953805" y="1944363"/>
-              <a:ext cx="1708855" cy="1980257"/>
-            </a:xfrm>
-            <a:prstGeom prst="rect">
-              <a:avLst/>
-            </a:prstGeom>
-            <a:noFill/>
-            <a:ln>
-              <a:noFill/>
-            </a:ln>
-          </p:spPr>
-          <p:txBody>
-            <a:bodyPr wrap="square" lIns="91440" tIns="45720" rIns="91440" bIns="45720">
-              <a:prstTxWarp prst="textArchUp">
-                <a:avLst/>
-              </a:prstTxWarp>
-              <a:spAutoFit/>
-            </a:bodyPr>
-            <a:lstStyle/>
-            <a:p>
-              <a:pPr algn="ctr"/>
-              <a:r>
-                <a:rPr lang="en-US" sz="6600" b="1" dirty="0">
-                  <a:ln w="12700">
-                    <a:solidFill>
-                      <a:schemeClr val="accent2"/>
-                    </a:solidFill>
-                    <a:prstDash val="solid"/>
-                  </a:ln>
-                  <a:solidFill>
-                    <a:schemeClr val="accent2"/>
-                  </a:solidFill>
-                  <a:effectLst>
-                    <a:outerShdw blurRad="50800" dist="38100" dir="5400000" algn="t" rotWithShape="0">
-                      <a:prstClr val="black">
-                        <a:alpha val="40000"/>
-                      </a:prstClr>
-                    </a:outerShdw>
-                  </a:effectLst>
-                </a:rPr>
-                <a:t>shinycustomloader</a:t>
-              </a:r>
-            </a:p>
-          </p:txBody>
-        </p:sp>
-      </p:grpSp>
       <p:pic>
         <p:nvPicPr>
-          <p:cNvPr id="5" name="Graphic 4">
-            <a:extLst>
-              <a:ext uri="{FF2B5EF4-FFF2-40B4-BE49-F238E27FC236}">
-                <a16:creationId xmlns:a16="http://schemas.microsoft.com/office/drawing/2014/main" id="{AEC3C34A-CC11-A548-ACCF-185222861F80}"/>
+          <p:cNvPr id="30" name="Graphic 29">
+            <a:extLst>
+              <a:ext uri="{FF2B5EF4-FFF2-40B4-BE49-F238E27FC236}">
+                <a16:creationId xmlns:a16="http://schemas.microsoft.com/office/drawing/2014/main" id="{78A60AEF-8A40-0D4D-A8C3-9498D14160DD}"/>
               </a:ext>
             </a:extLst>
           </p:cNvPr>
@@ -4831,12 +3627,253 @@
           </a:prstGeom>
         </p:spPr>
       </p:pic>
+      <p:sp>
+        <p:nvSpPr>
+          <p:cNvPr id="31" name="TextBox 30">
+            <a:extLst>
+              <a:ext uri="{FF2B5EF4-FFF2-40B4-BE49-F238E27FC236}">
+                <a16:creationId xmlns:a16="http://schemas.microsoft.com/office/drawing/2014/main" id="{0D3A88FC-43A7-C444-B03B-ECCD27A09318}"/>
+              </a:ext>
+            </a:extLst>
+          </p:cNvPr>
+          <p:cNvSpPr txBox="1"/>
+          <p:nvPr/>
+        </p:nvSpPr>
+        <p:spPr>
+          <a:xfrm>
+            <a:off x="5537619" y="1387979"/>
+            <a:ext cx="1026243" cy="400110"/>
+          </a:xfrm>
+          <a:prstGeom prst="rect">
+            <a:avLst/>
+          </a:prstGeom>
+          <a:noFill/>
+        </p:spPr>
+        <p:txBody>
+          <a:bodyPr wrap="none" rtlCol="0">
+            <a:spAutoFit/>
+          </a:bodyPr>
+          <a:lstStyle/>
+          <a:p>
+            <a:r>
+              <a:rPr lang="en-US" sz="2000" dirty="0">
+                <a:latin typeface="Avenir Next Condensed" panose="020B0506020202020204" pitchFamily="34" charset="0"/>
+              </a:rPr>
+              <a:t>DSCI 310</a:t>
+            </a:r>
+          </a:p>
+        </p:txBody>
+      </p:sp>
+      <p:sp>
+        <p:nvSpPr>
+          <p:cNvPr id="32" name="TextBox 31">
+            <a:extLst>
+              <a:ext uri="{FF2B5EF4-FFF2-40B4-BE49-F238E27FC236}">
+                <a16:creationId xmlns:a16="http://schemas.microsoft.com/office/drawing/2014/main" id="{0902CE12-E60C-5C44-9C7F-0AB83B12936F}"/>
+              </a:ext>
+            </a:extLst>
+          </p:cNvPr>
+          <p:cNvSpPr txBox="1"/>
+          <p:nvPr/>
+        </p:nvSpPr>
+        <p:spPr>
+          <a:xfrm>
+            <a:off x="5143280" y="2591446"/>
+            <a:ext cx="1896673" cy="523220"/>
+          </a:xfrm>
+          <a:prstGeom prst="rect">
+            <a:avLst/>
+          </a:prstGeom>
+          <a:noFill/>
+        </p:spPr>
+        <p:txBody>
+          <a:bodyPr wrap="none" rtlCol="0">
+            <a:spAutoFit/>
+          </a:bodyPr>
+          <a:lstStyle/>
+          <a:p>
+            <a:pPr algn="ctr"/>
+            <a:r>
+              <a:rPr lang="en-US" sz="1400" dirty="0">
+                <a:latin typeface="Avenir Next Condensed" panose="020B0506020202020204" pitchFamily="34" charset="0"/>
+              </a:rPr>
+              <a:t>Reproducible &amp; trustworthy</a:t>
+            </a:r>
+          </a:p>
+          <a:p>
+            <a:pPr algn="ctr"/>
+            <a:r>
+              <a:rPr lang="en-US" sz="1400" dirty="0">
+                <a:latin typeface="Avenir Next Condensed" panose="020B0506020202020204" pitchFamily="34" charset="0"/>
+              </a:rPr>
+              <a:t>workflows</a:t>
+            </a:r>
+          </a:p>
+        </p:txBody>
+      </p:sp>
+    </p:spTree>
+    <p:extLst>
+      <p:ext uri="{BB962C8B-B14F-4D97-AF65-F5344CB8AC3E}">
+        <p14:creationId xmlns:p14="http://schemas.microsoft.com/office/powerpoint/2010/main" val="421413058"/>
+      </p:ext>
+    </p:extLst>
+  </p:cSld>
+  <p:clrMapOvr>
+    <a:masterClrMapping/>
+  </p:clrMapOvr>
+</p:sld>
+</file>
+
+<file path=ppt/slides/slide2.xml><?xml version="1.0" encoding="utf-8"?>
+<p:sld xmlns:a="http://schemas.openxmlformats.org/drawingml/2006/main" xmlns:r="http://schemas.openxmlformats.org/officeDocument/2006/relationships" xmlns:p="http://schemas.openxmlformats.org/presentationml/2006/main">
+  <p:cSld>
+    <p:spTree>
+      <p:nvGrpSpPr>
+        <p:cNvPr id="1" name=""/>
+        <p:cNvGrpSpPr/>
+        <p:nvPr/>
+      </p:nvGrpSpPr>
+      <p:grpSpPr>
+        <a:xfrm>
+          <a:off x="0" y="0"/>
+          <a:ext cx="0" cy="0"/>
+          <a:chOff x="0" y="0"/>
+          <a:chExt cx="0" cy="0"/>
+        </a:xfrm>
+      </p:grpSpPr>
+      <p:sp>
+        <p:nvSpPr>
+          <p:cNvPr id="36" name="Hexagon 35">
+            <a:extLst>
+              <a:ext uri="{FF2B5EF4-FFF2-40B4-BE49-F238E27FC236}">
+                <a16:creationId xmlns:a16="http://schemas.microsoft.com/office/drawing/2014/main" id="{90E46B38-1301-774F-8904-FFF8966BD8C2}"/>
+              </a:ext>
+            </a:extLst>
+          </p:cNvPr>
+          <p:cNvSpPr>
+            <a:spLocks noChangeAspect="1"/>
+          </p:cNvSpPr>
+          <p:nvPr/>
+        </p:nvSpPr>
+        <p:spPr>
+          <a:xfrm rot="1800000">
+            <a:off x="4730817" y="1018831"/>
+            <a:ext cx="2721600" cy="2369033"/>
+          </a:xfrm>
+          <a:prstGeom prst="hexagon">
+            <a:avLst>
+              <a:gd name="adj" fmla="val 28372"/>
+              <a:gd name="vf" fmla="val 115470"/>
+            </a:avLst>
+          </a:prstGeom>
+          <a:solidFill>
+            <a:schemeClr val="bg1"/>
+          </a:solidFill>
+          <a:ln w="69850">
+            <a:solidFill>
+              <a:srgbClr val="CA225E"/>
+            </a:solidFill>
+          </a:ln>
+        </p:spPr>
+        <p:style>
+          <a:lnRef idx="2">
+            <a:schemeClr val="accent1">
+              <a:shade val="50000"/>
+            </a:schemeClr>
+          </a:lnRef>
+          <a:fillRef idx="1">
+            <a:schemeClr val="accent1"/>
+          </a:fillRef>
+          <a:effectRef idx="0">
+            <a:schemeClr val="accent1"/>
+          </a:effectRef>
+          <a:fontRef idx="minor">
+            <a:schemeClr val="lt1"/>
+          </a:fontRef>
+        </p:style>
+        <p:txBody>
+          <a:bodyPr rtlCol="0" anchor="ctr"/>
+          <a:lstStyle/>
+          <a:p>
+            <a:pPr algn="ctr"/>
+            <a:endParaRPr lang="en-US" dirty="0"/>
+          </a:p>
+        </p:txBody>
+      </p:sp>
+      <p:sp>
+        <p:nvSpPr>
+          <p:cNvPr id="28" name="Hexagon 27">
+            <a:extLst>
+              <a:ext uri="{FF2B5EF4-FFF2-40B4-BE49-F238E27FC236}">
+                <a16:creationId xmlns:a16="http://schemas.microsoft.com/office/drawing/2014/main" id="{CE262696-2CA3-D041-9FBF-B906C53D25F2}"/>
+              </a:ext>
+            </a:extLst>
+          </p:cNvPr>
+          <p:cNvSpPr>
+            <a:spLocks noChangeAspect="1"/>
+          </p:cNvSpPr>
+          <p:nvPr/>
+        </p:nvSpPr>
+        <p:spPr>
+          <a:xfrm rot="1800000">
+            <a:off x="4843367" y="1118260"/>
+            <a:ext cx="2503872" cy="2179510"/>
+          </a:xfrm>
+          <a:prstGeom prst="hexagon">
+            <a:avLst>
+              <a:gd name="adj" fmla="val 28372"/>
+              <a:gd name="vf" fmla="val 115470"/>
+            </a:avLst>
+          </a:prstGeom>
+          <a:solidFill>
+            <a:schemeClr val="bg1"/>
+          </a:solidFill>
+          <a:ln w="38100">
+            <a:solidFill>
+              <a:srgbClr val="F3CAD8"/>
+            </a:solidFill>
+            <a:extLst>
+              <a:ext uri="{C807C97D-BFC1-408E-A445-0C87EB9F89A2}">
+                <ask:lineSketchStyleProps xmlns:ask="http://schemas.microsoft.com/office/drawing/2018/sketchyshapes">
+                  <ask:type>
+                    <ask:lineSketchNone/>
+                  </ask:type>
+                </ask:lineSketchStyleProps>
+              </a:ext>
+            </a:extLst>
+          </a:ln>
+        </p:spPr>
+        <p:style>
+          <a:lnRef idx="2">
+            <a:schemeClr val="accent1">
+              <a:shade val="50000"/>
+            </a:schemeClr>
+          </a:lnRef>
+          <a:fillRef idx="1">
+            <a:schemeClr val="accent1"/>
+          </a:fillRef>
+          <a:effectRef idx="0">
+            <a:schemeClr val="accent1"/>
+          </a:effectRef>
+          <a:fontRef idx="minor">
+            <a:schemeClr val="lt1"/>
+          </a:fontRef>
+        </p:style>
+        <p:txBody>
+          <a:bodyPr rtlCol="0" anchor="ctr"/>
+          <a:lstStyle/>
+          <a:p>
+            <a:pPr algn="ctr"/>
+            <a:endParaRPr lang="en-US" dirty="0"/>
+          </a:p>
+        </p:txBody>
+      </p:sp>
       <p:pic>
         <p:nvPicPr>
-          <p:cNvPr id="7" name="Picture 6">
-            <a:extLst>
-              <a:ext uri="{FF2B5EF4-FFF2-40B4-BE49-F238E27FC236}">
-                <a16:creationId xmlns:a16="http://schemas.microsoft.com/office/drawing/2014/main" id="{F594849D-7268-8042-B51C-1A3211DD6AB7}"/>
+          <p:cNvPr id="5" name="Graphic 4">
+            <a:extLst>
+              <a:ext uri="{FF2B5EF4-FFF2-40B4-BE49-F238E27FC236}">
+                <a16:creationId xmlns:a16="http://schemas.microsoft.com/office/drawing/2014/main" id="{AEC3C34A-CC11-A548-ACCF-185222861F80}"/>
               </a:ext>
             </a:extLst>
           </p:cNvPr>
@@ -4846,15 +3883,21 @@
           <p:nvPr/>
         </p:nvPicPr>
         <p:blipFill>
-          <a:blip r:embed="rId5"/>
+          <a:blip r:embed="rId2">
+            <a:extLst>
+              <a:ext uri="{96DAC541-7B7A-43D3-8B79-37D633B846F1}">
+                <asvg:svgBlip xmlns:asvg="http://schemas.microsoft.com/office/drawing/2016/SVG/main" r:embed="rId3"/>
+              </a:ext>
+            </a:extLst>
+          </a:blip>
           <a:stretch>
             <a:fillRect/>
           </a:stretch>
         </p:blipFill>
         <p:spPr>
           <a:xfrm>
-            <a:off x="3814923" y="4938961"/>
-            <a:ext cx="749300" cy="952500"/>
+            <a:off x="5537619" y="1810723"/>
+            <a:ext cx="1107996" cy="761618"/>
           </a:xfrm>
           <a:prstGeom prst="rect">
             <a:avLst/>

</xml_diff>